<commit_message>
stats, coins & bombs
</commit_message>
<xml_diff>
--- a/images/images edit.pptx
+++ b/images/images edit.pptx
@@ -104,7 +104,57 @@
       </a:defRPr>
     </a:lvl9pPr>
   </p:defaultTextStyle>
+  <p:extLst>
+    <p:ext uri="{EFAFB233-063F-42B5-8137-9DF3F51BA10A}">
+      <p15:sldGuideLst xmlns:p15="http://schemas.microsoft.com/office/powerpoint/2012/main"/>
+    </p:ext>
+  </p:extLst>
 </p:presentation>
+</file>
+
+<file path=ppt/revisionInfo.xml><?xml version="1.0" encoding="utf-8"?>
+<p1510:revInfo xmlns:a="http://schemas.openxmlformats.org/drawingml/2006/main" xmlns:r="http://schemas.openxmlformats.org/officeDocument/2006/relationships" xmlns:p1510="http://schemas.microsoft.com/office/powerpoint/2015/10/main">
+  <p1510:revLst>
+    <p1510:client id="{112475B7-4419-4947-A687-53476E7CDD49}" v="50" dt="2022-10-18T09:18:43.133"/>
+  </p1510:revLst>
+</p1510:revInfo>
+</file>
+
+<file path=ppt/changesInfos/changesInfo1.xml><?xml version="1.0" encoding="utf-8"?>
+<pc:chgInfo xmlns:a="http://schemas.openxmlformats.org/drawingml/2006/main" xmlns:r="http://schemas.openxmlformats.org/officeDocument/2006/relationships" xmlns:ac="http://schemas.microsoft.com/office/drawing/2013/main/command" xmlns:pc="http://schemas.microsoft.com/office/powerpoint/2013/main/command">
+  <pc:docChgLst>
+    <pc:chgData name="איתי לביא עוקבי" userId="c3fd529b5a75ec58" providerId="LiveId" clId="{112475B7-4419-4947-A687-53476E7CDD49}"/>
+    <pc:docChg chg="undo modSld">
+      <pc:chgData name="איתי לביא עוקבי" userId="c3fd529b5a75ec58" providerId="LiveId" clId="{112475B7-4419-4947-A687-53476E7CDD49}" dt="2022-10-18T09:19:03.899" v="57" actId="732"/>
+      <pc:docMkLst>
+        <pc:docMk/>
+      </pc:docMkLst>
+      <pc:sldChg chg="addSp delSp modSp mod">
+        <pc:chgData name="איתי לביא עוקבי" userId="c3fd529b5a75ec58" providerId="LiveId" clId="{112475B7-4419-4947-A687-53476E7CDD49}" dt="2022-10-18T09:19:03.899" v="57" actId="732"/>
+        <pc:sldMkLst>
+          <pc:docMk/>
+          <pc:sldMk cId="2505828017" sldId="256"/>
+        </pc:sldMkLst>
+        <pc:picChg chg="add mod modCrop">
+          <ac:chgData name="איתי לביא עוקבי" userId="c3fd529b5a75ec58" providerId="LiveId" clId="{112475B7-4419-4947-A687-53476E7CDD49}" dt="2022-10-18T09:19:03.899" v="57" actId="732"/>
+          <ac:picMkLst>
+            <pc:docMk/>
+            <pc:sldMk cId="2505828017" sldId="256"/>
+            <ac:picMk id="3" creationId="{4A91C2E9-0F25-0A6C-0513-A2D8A60A6F12}"/>
+          </ac:picMkLst>
+        </pc:picChg>
+        <pc:picChg chg="add del mod">
+          <ac:chgData name="איתי לביא עוקבי" userId="c3fd529b5a75ec58" providerId="LiveId" clId="{112475B7-4419-4947-A687-53476E7CDD49}" dt="2022-10-18T09:17:20.537" v="17" actId="478"/>
+          <ac:picMkLst>
+            <pc:docMk/>
+            <pc:sldMk cId="2505828017" sldId="256"/>
+            <ac:picMk id="1026" creationId="{210FC9BA-4C75-6C6E-B7F5-FD2B0428A7AC}"/>
+          </ac:picMkLst>
+        </pc:picChg>
+      </pc:sldChg>
+    </pc:docChg>
+  </pc:docChgLst>
+</pc:chgInfo>
 </file>
 
 <file path=ppt/slideLayouts/slideLayout1.xml><?xml version="1.0" encoding="utf-8"?>
@@ -256,7 +306,7 @@
           <a:p>
             <a:fld id="{B5EC029B-4B76-4465-A85E-CA3BB556AD69}" type="datetimeFigureOut">
               <a:rPr lang="en-IL" smtClean="0"/>
-              <a:t>15/10/2022</a:t>
+              <a:t>18/10/2022</a:t>
             </a:fld>
             <a:endParaRPr lang="en-IL"/>
           </a:p>
@@ -456,7 +506,7 @@
           <a:p>
             <a:fld id="{B5EC029B-4B76-4465-A85E-CA3BB556AD69}" type="datetimeFigureOut">
               <a:rPr lang="en-IL" smtClean="0"/>
-              <a:t>15/10/2022</a:t>
+              <a:t>18/10/2022</a:t>
             </a:fld>
             <a:endParaRPr lang="en-IL"/>
           </a:p>
@@ -666,7 +716,7 @@
           <a:p>
             <a:fld id="{B5EC029B-4B76-4465-A85E-CA3BB556AD69}" type="datetimeFigureOut">
               <a:rPr lang="en-IL" smtClean="0"/>
-              <a:t>15/10/2022</a:t>
+              <a:t>18/10/2022</a:t>
             </a:fld>
             <a:endParaRPr lang="en-IL"/>
           </a:p>
@@ -866,7 +916,7 @@
           <a:p>
             <a:fld id="{B5EC029B-4B76-4465-A85E-CA3BB556AD69}" type="datetimeFigureOut">
               <a:rPr lang="en-IL" smtClean="0"/>
-              <a:t>15/10/2022</a:t>
+              <a:t>18/10/2022</a:t>
             </a:fld>
             <a:endParaRPr lang="en-IL"/>
           </a:p>
@@ -1142,7 +1192,7 @@
           <a:p>
             <a:fld id="{B5EC029B-4B76-4465-A85E-CA3BB556AD69}" type="datetimeFigureOut">
               <a:rPr lang="en-IL" smtClean="0"/>
-              <a:t>15/10/2022</a:t>
+              <a:t>18/10/2022</a:t>
             </a:fld>
             <a:endParaRPr lang="en-IL"/>
           </a:p>
@@ -1410,7 +1460,7 @@
           <a:p>
             <a:fld id="{B5EC029B-4B76-4465-A85E-CA3BB556AD69}" type="datetimeFigureOut">
               <a:rPr lang="en-IL" smtClean="0"/>
-              <a:t>15/10/2022</a:t>
+              <a:t>18/10/2022</a:t>
             </a:fld>
             <a:endParaRPr lang="en-IL"/>
           </a:p>
@@ -1825,7 +1875,7 @@
           <a:p>
             <a:fld id="{B5EC029B-4B76-4465-A85E-CA3BB556AD69}" type="datetimeFigureOut">
               <a:rPr lang="en-IL" smtClean="0"/>
-              <a:t>15/10/2022</a:t>
+              <a:t>18/10/2022</a:t>
             </a:fld>
             <a:endParaRPr lang="en-IL"/>
           </a:p>
@@ -1967,7 +2017,7 @@
           <a:p>
             <a:fld id="{B5EC029B-4B76-4465-A85E-CA3BB556AD69}" type="datetimeFigureOut">
               <a:rPr lang="en-IL" smtClean="0"/>
-              <a:t>15/10/2022</a:t>
+              <a:t>18/10/2022</a:t>
             </a:fld>
             <a:endParaRPr lang="en-IL"/>
           </a:p>
@@ -2080,7 +2130,7 @@
           <a:p>
             <a:fld id="{B5EC029B-4B76-4465-A85E-CA3BB556AD69}" type="datetimeFigureOut">
               <a:rPr lang="en-IL" smtClean="0"/>
-              <a:t>15/10/2022</a:t>
+              <a:t>18/10/2022</a:t>
             </a:fld>
             <a:endParaRPr lang="en-IL"/>
           </a:p>
@@ -2393,7 +2443,7 @@
           <a:p>
             <a:fld id="{B5EC029B-4B76-4465-A85E-CA3BB556AD69}" type="datetimeFigureOut">
               <a:rPr lang="en-IL" smtClean="0"/>
-              <a:t>15/10/2022</a:t>
+              <a:t>18/10/2022</a:t>
             </a:fld>
             <a:endParaRPr lang="en-IL"/>
           </a:p>
@@ -2682,7 +2732,7 @@
           <a:p>
             <a:fld id="{B5EC029B-4B76-4465-A85E-CA3BB556AD69}" type="datetimeFigureOut">
               <a:rPr lang="en-IL" smtClean="0"/>
-              <a:t>15/10/2022</a:t>
+              <a:t>18/10/2022</a:t>
             </a:fld>
             <a:endParaRPr lang="en-IL"/>
           </a:p>
@@ -2925,7 +2975,7 @@
           <a:p>
             <a:fld id="{B5EC029B-4B76-4465-A85E-CA3BB556AD69}" type="datetimeFigureOut">
               <a:rPr lang="en-IL" smtClean="0"/>
-              <a:t>15/10/2022</a:t>
+              <a:t>18/10/2022</a:t>
             </a:fld>
             <a:endParaRPr lang="en-IL"/>
           </a:p>
@@ -3433,6 +3483,100 @@
           </a:prstGeom>
         </p:spPr>
       </p:pic>
+      <p:pic>
+        <p:nvPicPr>
+          <p:cNvPr id="3" name="Picture 2">
+            <a:extLst>
+              <a:ext uri="{FF2B5EF4-FFF2-40B4-BE49-F238E27FC236}">
+                <a16:creationId xmlns:a16="http://schemas.microsoft.com/office/drawing/2014/main" id="{4A91C2E9-0F25-0A6C-0513-A2D8A60A6F12}"/>
+              </a:ext>
+            </a:extLst>
+          </p:cNvPr>
+          <p:cNvPicPr>
+            <a:picLocks noChangeAspect="1"/>
+          </p:cNvPicPr>
+          <p:nvPr/>
+        </p:nvPicPr>
+        <p:blipFill rotWithShape="1">
+          <a:blip r:embed="rId5">
+            <a:extLst>
+              <a:ext uri="{BEBA8EAE-BF5A-486C-A8C5-ECC9F3942E4B}">
+                <a14:imgProps xmlns:a14="http://schemas.microsoft.com/office/drawing/2010/main">
+                  <a14:imgLayer r:embed="rId6">
+                    <a14:imgEffect>
+                      <a14:backgroundRemoval t="5667" b="90000" l="6272" r="93380">
+                        <a14:foregroundMark x1="45296" y1="5667" x2="31707" y2="9000"/>
+                        <a14:foregroundMark x1="31707" y1="9000" x2="19512" y2="16667"/>
+                        <a14:foregroundMark x1="19512" y1="16667" x2="8362" y2="31333"/>
+                        <a14:foregroundMark x1="8362" y1="31333" x2="4181" y2="47333"/>
+                        <a14:foregroundMark x1="5499" y1="63728" x2="5575" y2="64667"/>
+                        <a14:foregroundMark x1="4181" y1="47333" x2="5493" y2="63649"/>
+                        <a14:foregroundMark x1="6049" y1="65140" x2="27950" y2="86964"/>
+                        <a14:foregroundMark x1="5575" y1="64667" x2="6012" y2="65103"/>
+                        <a14:foregroundMark x1="32742" y1="89789" x2="60553" y2="91418"/>
+                        <a14:foregroundMark x1="73351" y1="86559" x2="76480" y2="84688"/>
+                        <a14:foregroundMark x1="96383" y1="57000" x2="97561" y2="52667"/>
+                        <a14:foregroundMark x1="97561" y1="39261" x2="97561" y2="38555"/>
+                        <a14:foregroundMark x1="97561" y1="52667" x2="97561" y2="39499"/>
+                        <a14:foregroundMark x1="84867" y1="20178" x2="58537" y2="5667"/>
+                        <a14:foregroundMark x1="58537" y1="5667" x2="44599" y2="5667"/>
+                        <a14:foregroundMark x1="93084" y1="39989" x2="93728" y2="56000"/>
+                        <a14:foregroundMark x1="60279" y1="47000" x2="50174" y2="35333"/>
+                        <a14:foregroundMark x1="50174" y1="35333" x2="33449" y2="33667"/>
+                        <a14:foregroundMark x1="33449" y1="33667" x2="22648" y2="52667"/>
+                        <a14:foregroundMark x1="22648" y1="52667" x2="64460" y2="53667"/>
+                        <a14:foregroundMark x1="64460" y1="53667" x2="61324" y2="38000"/>
+                        <a14:foregroundMark x1="61324" y1="38000" x2="59233" y2="37667"/>
+                        <a14:foregroundMark x1="8711" y1="36667" x2="6272" y2="63000"/>
+                        <a14:foregroundMark x1="31707" y1="45333" x2="45993" y2="49333"/>
+                        <a14:foregroundMark x1="45993" y1="49333" x2="26132" y2="38000"/>
+                        <a14:foregroundMark x1="26132" y1="38000" x2="15679" y2="38333"/>
+                        <a14:foregroundMark x1="42509" y1="46667" x2="42160" y2="45667"/>
+                        <a14:foregroundMark x1="32753" y1="49667" x2="34843" y2="51667"/>
+                        <a14:foregroundMark x1="38676" y1="50333" x2="35889" y2="50000"/>
+                        <a14:foregroundMark x1="68641" y1="88000" x2="62369" y2="89333"/>
+                        <a14:backgroundMark x1="88502" y1="23000" x2="93031" y2="28667"/>
+                        <a14:backgroundMark x1="94425" y1="31000" x2="97213" y2="38667"/>
+                        <a14:backgroundMark x1="97213" y1="38333" x2="94077" y2="30333"/>
+                        <a14:backgroundMark x1="85366" y1="19667" x2="89199" y2="21667"/>
+                        <a14:backgroundMark x1="90941" y1="24000" x2="88153" y2="22000"/>
+                        <a14:backgroundMark x1="91986" y1="25000" x2="93728" y2="30000"/>
+                        <a14:backgroundMark x1="94425" y1="30333" x2="93380" y2="31000"/>
+                        <a14:backgroundMark x1="96167" y1="57000" x2="96167" y2="61000"/>
+                        <a14:backgroundMark x1="96167" y1="61333" x2="90592" y2="74333"/>
+                        <a14:backgroundMark x1="90592" y1="74333" x2="88502" y2="76000"/>
+                        <a14:backgroundMark x1="89547" y1="75000" x2="82927" y2="82000"/>
+                        <a14:backgroundMark x1="83275" y1="82000" x2="81533" y2="83333"/>
+                        <a14:backgroundMark x1="81185" y1="83333" x2="80139" y2="84000"/>
+                        <a14:backgroundMark x1="80836" y1="83000" x2="81185" y2="82333"/>
+                        <a14:backgroundMark x1="81185" y1="82667" x2="77700" y2="85667"/>
+                        <a14:backgroundMark x1="64009" y1="91454" x2="61324" y2="92333"/>
+                        <a14:backgroundMark x1="74564" y1="88000" x2="69837" y2="89547"/>
+                        <a14:backgroundMark x1="34146" y1="92667" x2="29268" y2="89667"/>
+                        <a14:backgroundMark x1="6969" y1="67667" x2="4878" y2="62000"/>
+                      </a14:backgroundRemoval>
+                    </a14:imgEffect>
+                  </a14:imgLayer>
+                </a14:imgProps>
+              </a:ext>
+              <a:ext uri="{28A0092B-C50C-407E-A947-70E740481C1C}">
+                <a14:useLocalDpi xmlns:a14="http://schemas.microsoft.com/office/drawing/2010/main" val="0"/>
+              </a:ext>
+            </a:extLst>
+          </a:blip>
+          <a:srcRect l="2624" t="3815" r="2877" b="6098"/>
+          <a:stretch/>
+        </p:blipFill>
+        <p:spPr>
+          <a:xfrm>
+            <a:off x="-960582" y="917201"/>
+            <a:ext cx="3445165" cy="3433125"/>
+          </a:xfrm>
+          <a:prstGeom prst="rect">
+            <a:avLst/>
+          </a:prstGeom>
+        </p:spPr>
+      </p:pic>
     </p:spTree>
     <p:extLst>
       <p:ext uri="{BB962C8B-B14F-4D97-AF65-F5344CB8AC3E}">

</xml_diff>